<commit_message>
Day 16 content and 17 agenda updated
</commit_message>
<xml_diff>
--- a/Day16/DockerAndKubernetes_Training-Day16.pptx
+++ b/Day16/DockerAndKubernetes_Training-Day16.pptx
@@ -5,17 +5,18 @@
     <p:sldMasterId id="2147483880" r:id="rId1"/>
   </p:sldMasterIdLst>
   <p:notesMasterIdLst>
-    <p:notesMasterId r:id="rId10"/>
+    <p:notesMasterId r:id="rId11"/>
   </p:notesMasterIdLst>
   <p:sldIdLst>
     <p:sldId id="439" r:id="rId2"/>
     <p:sldId id="442" r:id="rId3"/>
-    <p:sldId id="267" r:id="rId4"/>
-    <p:sldId id="445" r:id="rId5"/>
-    <p:sldId id="448" r:id="rId6"/>
-    <p:sldId id="446" r:id="rId7"/>
-    <p:sldId id="447" r:id="rId8"/>
-    <p:sldId id="438" r:id="rId9"/>
+    <p:sldId id="443" r:id="rId4"/>
+    <p:sldId id="444" r:id="rId5"/>
+    <p:sldId id="267" r:id="rId6"/>
+    <p:sldId id="445" r:id="rId7"/>
+    <p:sldId id="448" r:id="rId8"/>
+    <p:sldId id="446" r:id="rId9"/>
+    <p:sldId id="438" r:id="rId10"/>
   </p:sldIdLst>
   <p:sldSz cx="12192000" cy="6858000"/>
   <p:notesSz cx="6858000" cy="9144000"/>
@@ -14042,6 +14043,12 @@
           <a:p>
             <a:r>
               <a:rPr lang="en-US" dirty="0"/>
+              <a:t>Need of container orchestration/Production grade clustering</a:t>
+            </a:r>
+          </a:p>
+          <a:p>
+            <a:r>
+              <a:rPr lang="en-US" dirty="0"/>
               <a:t>Docker Native Clustering – Swarm Mode</a:t>
             </a:r>
           </a:p>
@@ -14125,6 +14132,964 @@
 </file>
 
 <file path=ppt/slides/slide3.xml><?xml version="1.0" encoding="utf-8"?>
+<p:sld xmlns:a="http://schemas.openxmlformats.org/drawingml/2006/main" xmlns:r="http://schemas.openxmlformats.org/officeDocument/2006/relationships" xmlns:p="http://schemas.openxmlformats.org/presentationml/2006/main">
+  <p:cSld>
+    <p:spTree>
+      <p:nvGrpSpPr>
+        <p:cNvPr id="1" name=""/>
+        <p:cNvGrpSpPr/>
+        <p:nvPr/>
+      </p:nvGrpSpPr>
+      <p:grpSpPr>
+        <a:xfrm>
+          <a:off x="0" y="0"/>
+          <a:ext cx="0" cy="0"/>
+          <a:chOff x="0" y="0"/>
+          <a:chExt cx="0" cy="0"/>
+        </a:xfrm>
+      </p:grpSpPr>
+      <p:sp>
+        <p:nvSpPr>
+          <p:cNvPr id="2" name="Title 1">
+            <a:extLst>
+              <a:ext uri="{FF2B5EF4-FFF2-40B4-BE49-F238E27FC236}">
+                <a16:creationId xmlns:a16="http://schemas.microsoft.com/office/drawing/2014/main" id="{FDF89CF4-3270-7D7A-FFAA-E4F78B74E24E}"/>
+              </a:ext>
+            </a:extLst>
+          </p:cNvPr>
+          <p:cNvSpPr>
+            <a:spLocks noGrp="1"/>
+          </p:cNvSpPr>
+          <p:nvPr>
+            <p:ph type="title"/>
+          </p:nvPr>
+        </p:nvSpPr>
+        <p:spPr/>
+        <p:txBody>
+          <a:bodyPr/>
+          <a:lstStyle/>
+          <a:p>
+            <a:r>
+              <a:rPr lang="en-US" dirty="0"/>
+              <a:t>Need of Container Orchestration</a:t>
+            </a:r>
+            <a:endParaRPr lang="en-IN" dirty="0"/>
+          </a:p>
+        </p:txBody>
+      </p:sp>
+      <p:pic>
+        <p:nvPicPr>
+          <p:cNvPr id="5" name="Content Placeholder 4">
+            <a:extLst>
+              <a:ext uri="{FF2B5EF4-FFF2-40B4-BE49-F238E27FC236}">
+                <a16:creationId xmlns:a16="http://schemas.microsoft.com/office/drawing/2014/main" id="{E7660DA8-075A-632C-C15C-2704C0DF4C22}"/>
+              </a:ext>
+            </a:extLst>
+          </p:cNvPr>
+          <p:cNvPicPr>
+            <a:picLocks noGrp="1" noChangeAspect="1"/>
+          </p:cNvPicPr>
+          <p:nvPr>
+            <p:ph idx="1"/>
+          </p:nvPr>
+        </p:nvPicPr>
+        <p:blipFill>
+          <a:blip r:embed="rId2">
+            <a:extLst>
+              <a:ext uri="{28A0092B-C50C-407E-A947-70E740481C1C}">
+                <a14:useLocalDpi xmlns:a14="http://schemas.microsoft.com/office/drawing/2010/main" val="0"/>
+              </a:ext>
+            </a:extLst>
+          </a:blip>
+          <a:stretch>
+            <a:fillRect/>
+          </a:stretch>
+        </p:blipFill>
+        <p:spPr>
+          <a:xfrm>
+            <a:off x="0" y="2532185"/>
+            <a:ext cx="6411837" cy="4325815"/>
+          </a:xfrm>
+        </p:spPr>
+      </p:pic>
+      <p:sp>
+        <p:nvSpPr>
+          <p:cNvPr id="6" name="Content Placeholder 2">
+            <a:extLst>
+              <a:ext uri="{FF2B5EF4-FFF2-40B4-BE49-F238E27FC236}">
+                <a16:creationId xmlns:a16="http://schemas.microsoft.com/office/drawing/2014/main" id="{7E7D6CB5-AF71-FC1A-A60E-DF7A242990C8}"/>
+              </a:ext>
+            </a:extLst>
+          </p:cNvPr>
+          <p:cNvSpPr txBox="1">
+            <a:spLocks/>
+          </p:cNvSpPr>
+          <p:nvPr/>
+        </p:nvSpPr>
+        <p:spPr>
+          <a:xfrm>
+            <a:off x="6411837" y="2532185"/>
+            <a:ext cx="5658243" cy="4325815"/>
+          </a:xfrm>
+          <a:prstGeom prst="rect">
+            <a:avLst/>
+          </a:prstGeom>
+        </p:spPr>
+        <p:txBody>
+          <a:bodyPr vert="horz" lIns="91440" tIns="45720" rIns="91440" bIns="45720" rtlCol="0">
+            <a:normAutofit/>
+          </a:bodyPr>
+          <a:lstStyle>
+            <a:lvl1pPr marL="342900" indent="-342900" algn="l" defTabSz="457200" rtl="0" eaLnBrk="1" latinLnBrk="0" hangingPunct="1">
+              <a:spcBef>
+                <a:spcPts val="1000"/>
+              </a:spcBef>
+              <a:spcAft>
+                <a:spcPts val="0"/>
+              </a:spcAft>
+              <a:buClr>
+                <a:schemeClr val="accent1"/>
+              </a:buClr>
+              <a:buSzPct val="80000"/>
+              <a:buFont typeface="Wingdings 3" charset="2"/>
+              <a:buChar char=""/>
+              <a:defRPr sz="1800" b="0" i="0" kern="1200">
+                <a:solidFill>
+                  <a:schemeClr val="tx1">
+                    <a:lumMod val="75000"/>
+                    <a:lumOff val="25000"/>
+                  </a:schemeClr>
+                </a:solidFill>
+                <a:latin typeface="+mn-lt"/>
+                <a:ea typeface="+mn-ea"/>
+                <a:cs typeface="+mn-cs"/>
+              </a:defRPr>
+            </a:lvl1pPr>
+            <a:lvl2pPr marL="742950" indent="-285750" algn="l" defTabSz="457200" rtl="0" eaLnBrk="1" latinLnBrk="0" hangingPunct="1">
+              <a:spcBef>
+                <a:spcPts val="1000"/>
+              </a:spcBef>
+              <a:spcAft>
+                <a:spcPts val="0"/>
+              </a:spcAft>
+              <a:buClr>
+                <a:schemeClr val="accent1"/>
+              </a:buClr>
+              <a:buSzPct val="80000"/>
+              <a:buFont typeface="Wingdings 3" charset="2"/>
+              <a:buChar char=""/>
+              <a:defRPr sz="1600" b="0" i="0" kern="1200">
+                <a:solidFill>
+                  <a:schemeClr val="tx1">
+                    <a:lumMod val="75000"/>
+                    <a:lumOff val="25000"/>
+                  </a:schemeClr>
+                </a:solidFill>
+                <a:latin typeface="+mn-lt"/>
+                <a:ea typeface="+mn-ea"/>
+                <a:cs typeface="+mn-cs"/>
+              </a:defRPr>
+            </a:lvl2pPr>
+            <a:lvl3pPr marL="1143000" indent="-228600" algn="l" defTabSz="457200" rtl="0" eaLnBrk="1" latinLnBrk="0" hangingPunct="1">
+              <a:spcBef>
+                <a:spcPts val="1000"/>
+              </a:spcBef>
+              <a:spcAft>
+                <a:spcPts val="0"/>
+              </a:spcAft>
+              <a:buClr>
+                <a:schemeClr val="accent1"/>
+              </a:buClr>
+              <a:buSzPct val="80000"/>
+              <a:buFont typeface="Wingdings 3" charset="2"/>
+              <a:buChar char=""/>
+              <a:defRPr sz="1400" b="0" i="0" kern="1200">
+                <a:solidFill>
+                  <a:schemeClr val="tx1">
+                    <a:lumMod val="75000"/>
+                    <a:lumOff val="25000"/>
+                  </a:schemeClr>
+                </a:solidFill>
+                <a:latin typeface="+mn-lt"/>
+                <a:ea typeface="+mn-ea"/>
+                <a:cs typeface="+mn-cs"/>
+              </a:defRPr>
+            </a:lvl3pPr>
+            <a:lvl4pPr marL="1600200" indent="-228600" algn="l" defTabSz="457200" rtl="0" eaLnBrk="1" latinLnBrk="0" hangingPunct="1">
+              <a:spcBef>
+                <a:spcPts val="1000"/>
+              </a:spcBef>
+              <a:spcAft>
+                <a:spcPts val="0"/>
+              </a:spcAft>
+              <a:buClr>
+                <a:schemeClr val="accent1"/>
+              </a:buClr>
+              <a:buSzPct val="80000"/>
+              <a:buFont typeface="Wingdings 3" charset="2"/>
+              <a:buChar char=""/>
+              <a:defRPr sz="1200" b="0" i="0" kern="1200">
+                <a:solidFill>
+                  <a:schemeClr val="tx1">
+                    <a:lumMod val="75000"/>
+                    <a:lumOff val="25000"/>
+                  </a:schemeClr>
+                </a:solidFill>
+                <a:latin typeface="+mn-lt"/>
+                <a:ea typeface="+mn-ea"/>
+                <a:cs typeface="+mn-cs"/>
+              </a:defRPr>
+            </a:lvl4pPr>
+            <a:lvl5pPr marL="2057400" indent="-228600" algn="l" defTabSz="457200" rtl="0" eaLnBrk="1" latinLnBrk="0" hangingPunct="1">
+              <a:spcBef>
+                <a:spcPts val="1000"/>
+              </a:spcBef>
+              <a:spcAft>
+                <a:spcPts val="0"/>
+              </a:spcAft>
+              <a:buClr>
+                <a:schemeClr val="accent1"/>
+              </a:buClr>
+              <a:buSzPct val="80000"/>
+              <a:buFont typeface="Wingdings 3" charset="2"/>
+              <a:buChar char=""/>
+              <a:defRPr sz="1200" b="0" i="0" kern="1200">
+                <a:solidFill>
+                  <a:schemeClr val="tx1">
+                    <a:lumMod val="75000"/>
+                    <a:lumOff val="25000"/>
+                  </a:schemeClr>
+                </a:solidFill>
+                <a:latin typeface="+mn-lt"/>
+                <a:ea typeface="+mn-ea"/>
+                <a:cs typeface="+mn-cs"/>
+              </a:defRPr>
+            </a:lvl5pPr>
+            <a:lvl6pPr marL="2514600" indent="-228600" algn="l" defTabSz="457200" rtl="0" eaLnBrk="1" latinLnBrk="0" hangingPunct="1">
+              <a:spcBef>
+                <a:spcPts val="1000"/>
+              </a:spcBef>
+              <a:spcAft>
+                <a:spcPts val="0"/>
+              </a:spcAft>
+              <a:buClr>
+                <a:schemeClr val="accent1"/>
+              </a:buClr>
+              <a:buSzPct val="80000"/>
+              <a:buFont typeface="Wingdings 3" charset="2"/>
+              <a:buChar char=""/>
+              <a:defRPr sz="1200" b="0" i="0" kern="1200">
+                <a:solidFill>
+                  <a:schemeClr val="tx1">
+                    <a:lumMod val="75000"/>
+                    <a:lumOff val="25000"/>
+                  </a:schemeClr>
+                </a:solidFill>
+                <a:latin typeface="+mn-lt"/>
+                <a:ea typeface="+mn-ea"/>
+                <a:cs typeface="+mn-cs"/>
+              </a:defRPr>
+            </a:lvl6pPr>
+            <a:lvl7pPr marL="2971800" indent="-228600" algn="l" defTabSz="457200" rtl="0" eaLnBrk="1" latinLnBrk="0" hangingPunct="1">
+              <a:spcBef>
+                <a:spcPts val="1000"/>
+              </a:spcBef>
+              <a:spcAft>
+                <a:spcPts val="0"/>
+              </a:spcAft>
+              <a:buClr>
+                <a:schemeClr val="accent1"/>
+              </a:buClr>
+              <a:buSzPct val="80000"/>
+              <a:buFont typeface="Wingdings 3" charset="2"/>
+              <a:buChar char=""/>
+              <a:defRPr sz="1200" b="0" i="0" kern="1200">
+                <a:solidFill>
+                  <a:schemeClr val="tx1">
+                    <a:lumMod val="75000"/>
+                    <a:lumOff val="25000"/>
+                  </a:schemeClr>
+                </a:solidFill>
+                <a:latin typeface="+mn-lt"/>
+                <a:ea typeface="+mn-ea"/>
+                <a:cs typeface="+mn-cs"/>
+              </a:defRPr>
+            </a:lvl7pPr>
+            <a:lvl8pPr marL="3429000" indent="-228600" algn="l" defTabSz="457200" rtl="0" eaLnBrk="1" latinLnBrk="0" hangingPunct="1">
+              <a:spcBef>
+                <a:spcPts val="1000"/>
+              </a:spcBef>
+              <a:spcAft>
+                <a:spcPts val="0"/>
+              </a:spcAft>
+              <a:buClr>
+                <a:schemeClr val="accent1"/>
+              </a:buClr>
+              <a:buSzPct val="80000"/>
+              <a:buFont typeface="Wingdings 3" charset="2"/>
+              <a:buChar char=""/>
+              <a:defRPr sz="1200" b="0" i="0" kern="1200">
+                <a:solidFill>
+                  <a:schemeClr val="tx1">
+                    <a:lumMod val="75000"/>
+                    <a:lumOff val="25000"/>
+                  </a:schemeClr>
+                </a:solidFill>
+                <a:latin typeface="+mn-lt"/>
+                <a:ea typeface="+mn-ea"/>
+                <a:cs typeface="+mn-cs"/>
+              </a:defRPr>
+            </a:lvl8pPr>
+            <a:lvl9pPr marL="3886200" indent="-228600" algn="l" defTabSz="457200" rtl="0" eaLnBrk="1" latinLnBrk="0" hangingPunct="1">
+              <a:spcBef>
+                <a:spcPts val="1000"/>
+              </a:spcBef>
+              <a:spcAft>
+                <a:spcPts val="0"/>
+              </a:spcAft>
+              <a:buClr>
+                <a:schemeClr val="accent1"/>
+              </a:buClr>
+              <a:buSzPct val="80000"/>
+              <a:buFont typeface="Wingdings 3" charset="2"/>
+              <a:buChar char=""/>
+              <a:defRPr sz="1200" b="0" i="0" kern="1200">
+                <a:solidFill>
+                  <a:schemeClr val="tx1">
+                    <a:lumMod val="75000"/>
+                    <a:lumOff val="25000"/>
+                  </a:schemeClr>
+                </a:solidFill>
+                <a:latin typeface="+mn-lt"/>
+                <a:ea typeface="+mn-ea"/>
+                <a:cs typeface="+mn-cs"/>
+              </a:defRPr>
+            </a:lvl9pPr>
+          </a:lstStyle>
+          <a:p>
+            <a:r>
+              <a:rPr lang="en-US" b="1" dirty="0"/>
+              <a:t>Need</a:t>
+            </a:r>
+          </a:p>
+          <a:p>
+            <a:pPr lvl="1">
+              <a:buFont typeface="Wingdings" panose="05000000000000000000" pitchFamily="2" charset="2"/>
+              <a:buChar char="Ø"/>
+            </a:pPr>
+            <a:r>
+              <a:rPr lang="en-US" dirty="0"/>
+              <a:t>Move away from Development area to environment grade deployments</a:t>
+            </a:r>
+          </a:p>
+          <a:p>
+            <a:pPr lvl="1">
+              <a:buFont typeface="Wingdings" panose="05000000000000000000" pitchFamily="2" charset="2"/>
+              <a:buChar char="Ø"/>
+            </a:pPr>
+            <a:r>
+              <a:rPr lang="en-US" dirty="0"/>
+              <a:t>Container orchestration enables automated deployments, management, scaling and container networking</a:t>
+            </a:r>
+          </a:p>
+          <a:p>
+            <a:pPr lvl="1">
+              <a:buFont typeface="Wingdings" panose="05000000000000000000" pitchFamily="2" charset="2"/>
+              <a:buChar char="Ø"/>
+            </a:pPr>
+            <a:r>
+              <a:rPr lang="en-US" dirty="0"/>
+              <a:t>Container orchestration remove/reduce manual intervention</a:t>
+            </a:r>
+          </a:p>
+          <a:p>
+            <a:pPr lvl="1">
+              <a:buFont typeface="Wingdings" panose="05000000000000000000" pitchFamily="2" charset="2"/>
+              <a:buChar char="Ø"/>
+            </a:pPr>
+            <a:r>
+              <a:rPr lang="en-US" dirty="0"/>
+              <a:t>Container orchestration reduce operational overhead because of self management and better control</a:t>
+            </a:r>
+          </a:p>
+          <a:p>
+            <a:pPr lvl="1">
+              <a:buFont typeface="Wingdings" panose="05000000000000000000" pitchFamily="2" charset="2"/>
+              <a:buChar char="Ø"/>
+            </a:pPr>
+            <a:r>
+              <a:rPr lang="en-US" dirty="0"/>
+              <a:t>Deployment on environments based on project/application need without thinking of platform redesign.</a:t>
+            </a:r>
+          </a:p>
+          <a:p>
+            <a:pPr lvl="2"/>
+            <a:endParaRPr lang="en-US" dirty="0"/>
+          </a:p>
+          <a:p>
+            <a:pPr marL="914400" lvl="2" indent="0">
+              <a:buNone/>
+            </a:pPr>
+            <a:endParaRPr lang="en-US" dirty="0"/>
+          </a:p>
+          <a:p>
+            <a:pPr lvl="1"/>
+            <a:endParaRPr lang="en-US" dirty="0"/>
+          </a:p>
+          <a:p>
+            <a:pPr marL="1371600" lvl="3" indent="0">
+              <a:buNone/>
+            </a:pPr>
+            <a:endParaRPr lang="en-US" dirty="0"/>
+          </a:p>
+          <a:p>
+            <a:pPr marL="0" indent="0">
+              <a:buNone/>
+            </a:pPr>
+            <a:endParaRPr lang="en-US" dirty="0"/>
+          </a:p>
+          <a:p>
+            <a:pPr marL="457200" lvl="1" indent="0">
+              <a:buNone/>
+            </a:pPr>
+            <a:endParaRPr lang="en-US" dirty="0"/>
+          </a:p>
+          <a:p>
+            <a:endParaRPr lang="en-US" dirty="0"/>
+          </a:p>
+          <a:p>
+            <a:endParaRPr lang="en-IN" dirty="0"/>
+          </a:p>
+          <a:p>
+            <a:pPr lvl="1"/>
+            <a:endParaRPr lang="en-IN" dirty="0"/>
+          </a:p>
+          <a:p>
+            <a:pPr lvl="1"/>
+            <a:endParaRPr lang="en-IN" dirty="0"/>
+          </a:p>
+        </p:txBody>
+      </p:sp>
+    </p:spTree>
+    <p:extLst>
+      <p:ext uri="{BB962C8B-B14F-4D97-AF65-F5344CB8AC3E}">
+        <p14:creationId xmlns:p14="http://schemas.microsoft.com/office/powerpoint/2010/main" val="2712166060"/>
+      </p:ext>
+    </p:extLst>
+  </p:cSld>
+  <p:clrMapOvr>
+    <a:masterClrMapping/>
+  </p:clrMapOvr>
+</p:sld>
+</file>
+
+<file path=ppt/slides/slide4.xml><?xml version="1.0" encoding="utf-8"?>
+<p:sld xmlns:a="http://schemas.openxmlformats.org/drawingml/2006/main" xmlns:r="http://schemas.openxmlformats.org/officeDocument/2006/relationships" xmlns:p="http://schemas.openxmlformats.org/presentationml/2006/main">
+  <p:cSld>
+    <p:spTree>
+      <p:nvGrpSpPr>
+        <p:cNvPr id="1" name=""/>
+        <p:cNvGrpSpPr/>
+        <p:nvPr/>
+      </p:nvGrpSpPr>
+      <p:grpSpPr>
+        <a:xfrm>
+          <a:off x="0" y="0"/>
+          <a:ext cx="0" cy="0"/>
+          <a:chOff x="0" y="0"/>
+          <a:chExt cx="0" cy="0"/>
+        </a:xfrm>
+      </p:grpSpPr>
+      <p:sp>
+        <p:nvSpPr>
+          <p:cNvPr id="2" name="Title 1">
+            <a:extLst>
+              <a:ext uri="{FF2B5EF4-FFF2-40B4-BE49-F238E27FC236}">
+                <a16:creationId xmlns:a16="http://schemas.microsoft.com/office/drawing/2014/main" id="{E56F869C-A1E7-4989-E938-BA5DE46D1FD1}"/>
+              </a:ext>
+            </a:extLst>
+          </p:cNvPr>
+          <p:cNvSpPr>
+            <a:spLocks noGrp="1"/>
+          </p:cNvSpPr>
+          <p:nvPr>
+            <p:ph type="title"/>
+          </p:nvPr>
+        </p:nvSpPr>
+        <p:spPr>
+          <a:xfrm>
+            <a:off x="717453" y="973668"/>
+            <a:ext cx="9198914" cy="706964"/>
+          </a:xfrm>
+        </p:spPr>
+        <p:txBody>
+          <a:bodyPr>
+            <a:normAutofit/>
+          </a:bodyPr>
+          <a:lstStyle/>
+          <a:p>
+            <a:r>
+              <a:rPr lang="en-US" dirty="0"/>
+              <a:t>Container Orchestration - More</a:t>
+            </a:r>
+            <a:endParaRPr lang="en-IN" dirty="0"/>
+          </a:p>
+        </p:txBody>
+      </p:sp>
+      <p:sp>
+        <p:nvSpPr>
+          <p:cNvPr id="3" name="Content Placeholder 2">
+            <a:extLst>
+              <a:ext uri="{FF2B5EF4-FFF2-40B4-BE49-F238E27FC236}">
+                <a16:creationId xmlns:a16="http://schemas.microsoft.com/office/drawing/2014/main" id="{7B137940-CBB4-B117-F716-B9C1515405BD}"/>
+              </a:ext>
+            </a:extLst>
+          </p:cNvPr>
+          <p:cNvSpPr txBox="1">
+            <a:spLocks/>
+          </p:cNvSpPr>
+          <p:nvPr/>
+        </p:nvSpPr>
+        <p:spPr>
+          <a:xfrm>
+            <a:off x="140677" y="2335238"/>
+            <a:ext cx="5120640" cy="4276578"/>
+          </a:xfrm>
+          <a:prstGeom prst="rect">
+            <a:avLst/>
+          </a:prstGeom>
+        </p:spPr>
+        <p:txBody>
+          <a:bodyPr vert="horz" lIns="91440" tIns="45720" rIns="91440" bIns="45720" rtlCol="0">
+            <a:normAutofit fontScale="92500" lnSpcReduction="20000"/>
+          </a:bodyPr>
+          <a:lstStyle>
+            <a:lvl1pPr marL="342900" indent="-342900" algn="l" defTabSz="457200" rtl="0" eaLnBrk="1" latinLnBrk="0" hangingPunct="1">
+              <a:spcBef>
+                <a:spcPts val="1000"/>
+              </a:spcBef>
+              <a:spcAft>
+                <a:spcPts val="0"/>
+              </a:spcAft>
+              <a:buClr>
+                <a:schemeClr val="accent1"/>
+              </a:buClr>
+              <a:buSzPct val="80000"/>
+              <a:buFont typeface="Wingdings 3" charset="2"/>
+              <a:buChar char=""/>
+              <a:defRPr sz="1800" b="0" i="0" kern="1200">
+                <a:solidFill>
+                  <a:schemeClr val="tx1">
+                    <a:lumMod val="75000"/>
+                    <a:lumOff val="25000"/>
+                  </a:schemeClr>
+                </a:solidFill>
+                <a:latin typeface="+mn-lt"/>
+                <a:ea typeface="+mn-ea"/>
+                <a:cs typeface="+mn-cs"/>
+              </a:defRPr>
+            </a:lvl1pPr>
+            <a:lvl2pPr marL="742950" indent="-285750" algn="l" defTabSz="457200" rtl="0" eaLnBrk="1" latinLnBrk="0" hangingPunct="1">
+              <a:spcBef>
+                <a:spcPts val="1000"/>
+              </a:spcBef>
+              <a:spcAft>
+                <a:spcPts val="0"/>
+              </a:spcAft>
+              <a:buClr>
+                <a:schemeClr val="accent1"/>
+              </a:buClr>
+              <a:buSzPct val="80000"/>
+              <a:buFont typeface="Wingdings 3" charset="2"/>
+              <a:buChar char=""/>
+              <a:defRPr sz="1600" b="0" i="0" kern="1200">
+                <a:solidFill>
+                  <a:schemeClr val="tx1">
+                    <a:lumMod val="75000"/>
+                    <a:lumOff val="25000"/>
+                  </a:schemeClr>
+                </a:solidFill>
+                <a:latin typeface="+mn-lt"/>
+                <a:ea typeface="+mn-ea"/>
+                <a:cs typeface="+mn-cs"/>
+              </a:defRPr>
+            </a:lvl2pPr>
+            <a:lvl3pPr marL="1143000" indent="-228600" algn="l" defTabSz="457200" rtl="0" eaLnBrk="1" latinLnBrk="0" hangingPunct="1">
+              <a:spcBef>
+                <a:spcPts val="1000"/>
+              </a:spcBef>
+              <a:spcAft>
+                <a:spcPts val="0"/>
+              </a:spcAft>
+              <a:buClr>
+                <a:schemeClr val="accent1"/>
+              </a:buClr>
+              <a:buSzPct val="80000"/>
+              <a:buFont typeface="Wingdings 3" charset="2"/>
+              <a:buChar char=""/>
+              <a:defRPr sz="1400" b="0" i="0" kern="1200">
+                <a:solidFill>
+                  <a:schemeClr val="tx1">
+                    <a:lumMod val="75000"/>
+                    <a:lumOff val="25000"/>
+                  </a:schemeClr>
+                </a:solidFill>
+                <a:latin typeface="+mn-lt"/>
+                <a:ea typeface="+mn-ea"/>
+                <a:cs typeface="+mn-cs"/>
+              </a:defRPr>
+            </a:lvl3pPr>
+            <a:lvl4pPr marL="1600200" indent="-228600" algn="l" defTabSz="457200" rtl="0" eaLnBrk="1" latinLnBrk="0" hangingPunct="1">
+              <a:spcBef>
+                <a:spcPts val="1000"/>
+              </a:spcBef>
+              <a:spcAft>
+                <a:spcPts val="0"/>
+              </a:spcAft>
+              <a:buClr>
+                <a:schemeClr val="accent1"/>
+              </a:buClr>
+              <a:buSzPct val="80000"/>
+              <a:buFont typeface="Wingdings 3" charset="2"/>
+              <a:buChar char=""/>
+              <a:defRPr sz="1200" b="0" i="0" kern="1200">
+                <a:solidFill>
+                  <a:schemeClr val="tx1">
+                    <a:lumMod val="75000"/>
+                    <a:lumOff val="25000"/>
+                  </a:schemeClr>
+                </a:solidFill>
+                <a:latin typeface="+mn-lt"/>
+                <a:ea typeface="+mn-ea"/>
+                <a:cs typeface="+mn-cs"/>
+              </a:defRPr>
+            </a:lvl4pPr>
+            <a:lvl5pPr marL="2057400" indent="-228600" algn="l" defTabSz="457200" rtl="0" eaLnBrk="1" latinLnBrk="0" hangingPunct="1">
+              <a:spcBef>
+                <a:spcPts val="1000"/>
+              </a:spcBef>
+              <a:spcAft>
+                <a:spcPts val="0"/>
+              </a:spcAft>
+              <a:buClr>
+                <a:schemeClr val="accent1"/>
+              </a:buClr>
+              <a:buSzPct val="80000"/>
+              <a:buFont typeface="Wingdings 3" charset="2"/>
+              <a:buChar char=""/>
+              <a:defRPr sz="1200" b="0" i="0" kern="1200">
+                <a:solidFill>
+                  <a:schemeClr val="tx1">
+                    <a:lumMod val="75000"/>
+                    <a:lumOff val="25000"/>
+                  </a:schemeClr>
+                </a:solidFill>
+                <a:latin typeface="+mn-lt"/>
+                <a:ea typeface="+mn-ea"/>
+                <a:cs typeface="+mn-cs"/>
+              </a:defRPr>
+            </a:lvl5pPr>
+            <a:lvl6pPr marL="2514600" indent="-228600" algn="l" defTabSz="457200" rtl="0" eaLnBrk="1" latinLnBrk="0" hangingPunct="1">
+              <a:spcBef>
+                <a:spcPts val="1000"/>
+              </a:spcBef>
+              <a:spcAft>
+                <a:spcPts val="0"/>
+              </a:spcAft>
+              <a:buClr>
+                <a:schemeClr val="accent1"/>
+              </a:buClr>
+              <a:buSzPct val="80000"/>
+              <a:buFont typeface="Wingdings 3" charset="2"/>
+              <a:buChar char=""/>
+              <a:defRPr sz="1200" b="0" i="0" kern="1200">
+                <a:solidFill>
+                  <a:schemeClr val="tx1">
+                    <a:lumMod val="75000"/>
+                    <a:lumOff val="25000"/>
+                  </a:schemeClr>
+                </a:solidFill>
+                <a:latin typeface="+mn-lt"/>
+                <a:ea typeface="+mn-ea"/>
+                <a:cs typeface="+mn-cs"/>
+              </a:defRPr>
+            </a:lvl6pPr>
+            <a:lvl7pPr marL="2971800" indent="-228600" algn="l" defTabSz="457200" rtl="0" eaLnBrk="1" latinLnBrk="0" hangingPunct="1">
+              <a:spcBef>
+                <a:spcPts val="1000"/>
+              </a:spcBef>
+              <a:spcAft>
+                <a:spcPts val="0"/>
+              </a:spcAft>
+              <a:buClr>
+                <a:schemeClr val="accent1"/>
+              </a:buClr>
+              <a:buSzPct val="80000"/>
+              <a:buFont typeface="Wingdings 3" charset="2"/>
+              <a:buChar char=""/>
+              <a:defRPr sz="1200" b="0" i="0" kern="1200">
+                <a:solidFill>
+                  <a:schemeClr val="tx1">
+                    <a:lumMod val="75000"/>
+                    <a:lumOff val="25000"/>
+                  </a:schemeClr>
+                </a:solidFill>
+                <a:latin typeface="+mn-lt"/>
+                <a:ea typeface="+mn-ea"/>
+                <a:cs typeface="+mn-cs"/>
+              </a:defRPr>
+            </a:lvl7pPr>
+            <a:lvl8pPr marL="3429000" indent="-228600" algn="l" defTabSz="457200" rtl="0" eaLnBrk="1" latinLnBrk="0" hangingPunct="1">
+              <a:spcBef>
+                <a:spcPts val="1000"/>
+              </a:spcBef>
+              <a:spcAft>
+                <a:spcPts val="0"/>
+              </a:spcAft>
+              <a:buClr>
+                <a:schemeClr val="accent1"/>
+              </a:buClr>
+              <a:buSzPct val="80000"/>
+              <a:buFont typeface="Wingdings 3" charset="2"/>
+              <a:buChar char=""/>
+              <a:defRPr sz="1200" b="0" i="0" kern="1200">
+                <a:solidFill>
+                  <a:schemeClr val="tx1">
+                    <a:lumMod val="75000"/>
+                    <a:lumOff val="25000"/>
+                  </a:schemeClr>
+                </a:solidFill>
+                <a:latin typeface="+mn-lt"/>
+                <a:ea typeface="+mn-ea"/>
+                <a:cs typeface="+mn-cs"/>
+              </a:defRPr>
+            </a:lvl8pPr>
+            <a:lvl9pPr marL="3886200" indent="-228600" algn="l" defTabSz="457200" rtl="0" eaLnBrk="1" latinLnBrk="0" hangingPunct="1">
+              <a:spcBef>
+                <a:spcPts val="1000"/>
+              </a:spcBef>
+              <a:spcAft>
+                <a:spcPts val="0"/>
+              </a:spcAft>
+              <a:buClr>
+                <a:schemeClr val="accent1"/>
+              </a:buClr>
+              <a:buSzPct val="80000"/>
+              <a:buFont typeface="Wingdings 3" charset="2"/>
+              <a:buChar char=""/>
+              <a:defRPr sz="1200" b="0" i="0" kern="1200">
+                <a:solidFill>
+                  <a:schemeClr val="tx1">
+                    <a:lumMod val="75000"/>
+                    <a:lumOff val="25000"/>
+                  </a:schemeClr>
+                </a:solidFill>
+                <a:latin typeface="+mn-lt"/>
+                <a:ea typeface="+mn-ea"/>
+                <a:cs typeface="+mn-cs"/>
+              </a:defRPr>
+            </a:lvl9pPr>
+          </a:lstStyle>
+          <a:p>
+            <a:r>
+              <a:rPr lang="en-US" b="1" dirty="0"/>
+              <a:t>Benefit and Use</a:t>
+            </a:r>
+          </a:p>
+          <a:p>
+            <a:pPr lvl="1">
+              <a:buFont typeface="Wingdings" panose="05000000000000000000" pitchFamily="2" charset="2"/>
+              <a:buChar char="Ø"/>
+            </a:pPr>
+            <a:r>
+              <a:rPr lang="en-US" dirty="0"/>
+              <a:t>Efficient resource management</a:t>
+            </a:r>
+          </a:p>
+          <a:p>
+            <a:pPr lvl="1">
+              <a:buFont typeface="Wingdings" panose="05000000000000000000" pitchFamily="2" charset="2"/>
+              <a:buChar char="Ø"/>
+            </a:pPr>
+            <a:r>
+              <a:rPr lang="en-US" dirty="0"/>
+              <a:t>Provisioning and deployment</a:t>
+            </a:r>
+          </a:p>
+          <a:p>
+            <a:pPr lvl="1">
+              <a:buFont typeface="Wingdings" panose="05000000000000000000" pitchFamily="2" charset="2"/>
+              <a:buChar char="Ø"/>
+            </a:pPr>
+            <a:r>
+              <a:rPr lang="en-US" dirty="0"/>
+              <a:t>Configuration and scheduling </a:t>
+            </a:r>
+          </a:p>
+          <a:p>
+            <a:pPr lvl="1">
+              <a:buFont typeface="Wingdings" panose="05000000000000000000" pitchFamily="2" charset="2"/>
+              <a:buChar char="Ø"/>
+            </a:pPr>
+            <a:r>
+              <a:rPr lang="en-US" dirty="0"/>
+              <a:t>Container availability/agility</a:t>
+            </a:r>
+          </a:p>
+          <a:p>
+            <a:pPr lvl="1">
+              <a:buFont typeface="Wingdings" panose="05000000000000000000" pitchFamily="2" charset="2"/>
+              <a:buChar char="Ø"/>
+            </a:pPr>
+            <a:r>
+              <a:rPr lang="en-US" dirty="0"/>
+              <a:t>Scaling or removing containers based on balancing workloads across your infrastructure</a:t>
+            </a:r>
+          </a:p>
+          <a:p>
+            <a:pPr lvl="1">
+              <a:buFont typeface="Wingdings" panose="05000000000000000000" pitchFamily="2" charset="2"/>
+              <a:buChar char="Ø"/>
+            </a:pPr>
+            <a:r>
+              <a:rPr lang="en-US" dirty="0"/>
+              <a:t>Load balancing and traffic routing </a:t>
+            </a:r>
+          </a:p>
+          <a:p>
+            <a:pPr lvl="1">
+              <a:buFont typeface="Wingdings" panose="05000000000000000000" pitchFamily="2" charset="2"/>
+              <a:buChar char="Ø"/>
+            </a:pPr>
+            <a:r>
+              <a:rPr lang="en-US" dirty="0"/>
+              <a:t>Monitoring container health</a:t>
+            </a:r>
+          </a:p>
+          <a:p>
+            <a:pPr lvl="1">
+              <a:buFont typeface="Wingdings" panose="05000000000000000000" pitchFamily="2" charset="2"/>
+              <a:buChar char="Ø"/>
+            </a:pPr>
+            <a:r>
+              <a:rPr lang="en-US" dirty="0"/>
+              <a:t>Configuring applications based on the container in which they will run</a:t>
+            </a:r>
+          </a:p>
+          <a:p>
+            <a:pPr lvl="1">
+              <a:buFont typeface="Wingdings" panose="05000000000000000000" pitchFamily="2" charset="2"/>
+              <a:buChar char="Ø"/>
+            </a:pPr>
+            <a:r>
+              <a:rPr lang="en-US" dirty="0"/>
+              <a:t>Keeping interactions between containers secure</a:t>
+            </a:r>
+          </a:p>
+          <a:p>
+            <a:pPr lvl="1">
+              <a:buFont typeface="Wingdings" panose="05000000000000000000" pitchFamily="2" charset="2"/>
+              <a:buChar char="Ø"/>
+            </a:pPr>
+            <a:r>
+              <a:rPr lang="en-US" dirty="0"/>
+              <a:t>Best fit for Microservice Architecture</a:t>
+            </a:r>
+          </a:p>
+          <a:p>
+            <a:pPr marL="914400" lvl="2" indent="0">
+              <a:buNone/>
+            </a:pPr>
+            <a:endParaRPr lang="en-US" dirty="0"/>
+          </a:p>
+          <a:p>
+            <a:pPr lvl="1"/>
+            <a:endParaRPr lang="en-US" dirty="0"/>
+          </a:p>
+          <a:p>
+            <a:pPr marL="1371600" lvl="3" indent="0">
+              <a:buNone/>
+            </a:pPr>
+            <a:endParaRPr lang="en-US" dirty="0"/>
+          </a:p>
+          <a:p>
+            <a:pPr marL="0" indent="0">
+              <a:buNone/>
+            </a:pPr>
+            <a:endParaRPr lang="en-US" dirty="0"/>
+          </a:p>
+          <a:p>
+            <a:pPr marL="457200" lvl="1" indent="0">
+              <a:buNone/>
+            </a:pPr>
+            <a:endParaRPr lang="en-US" dirty="0"/>
+          </a:p>
+          <a:p>
+            <a:endParaRPr lang="en-US" dirty="0"/>
+          </a:p>
+          <a:p>
+            <a:endParaRPr lang="en-IN" dirty="0"/>
+          </a:p>
+          <a:p>
+            <a:pPr lvl="1"/>
+            <a:endParaRPr lang="en-IN" dirty="0"/>
+          </a:p>
+          <a:p>
+            <a:pPr lvl="1"/>
+            <a:endParaRPr lang="en-IN" dirty="0"/>
+          </a:p>
+        </p:txBody>
+      </p:sp>
+      <p:pic>
+        <p:nvPicPr>
+          <p:cNvPr id="7" name="Picture 6">
+            <a:extLst>
+              <a:ext uri="{FF2B5EF4-FFF2-40B4-BE49-F238E27FC236}">
+                <a16:creationId xmlns:a16="http://schemas.microsoft.com/office/drawing/2014/main" id="{5C06FEEA-5EEA-C2AB-F0EE-9723DB0C6266}"/>
+              </a:ext>
+            </a:extLst>
+          </p:cNvPr>
+          <p:cNvPicPr>
+            <a:picLocks noChangeAspect="1"/>
+          </p:cNvPicPr>
+          <p:nvPr/>
+        </p:nvPicPr>
+        <p:blipFill>
+          <a:blip r:embed="rId2">
+            <a:extLst>
+              <a:ext uri="{28A0092B-C50C-407E-A947-70E740481C1C}">
+                <a14:useLocalDpi xmlns:a14="http://schemas.microsoft.com/office/drawing/2010/main" val="0"/>
+              </a:ext>
+            </a:extLst>
+          </a:blip>
+          <a:stretch>
+            <a:fillRect/>
+          </a:stretch>
+        </p:blipFill>
+        <p:spPr>
+          <a:xfrm>
+            <a:off x="5152651" y="2335238"/>
+            <a:ext cx="6898672" cy="4522762"/>
+          </a:xfrm>
+          <a:prstGeom prst="rect">
+            <a:avLst/>
+          </a:prstGeom>
+        </p:spPr>
+      </p:pic>
+    </p:spTree>
+    <p:extLst>
+      <p:ext uri="{BB962C8B-B14F-4D97-AF65-F5344CB8AC3E}">
+        <p14:creationId xmlns:p14="http://schemas.microsoft.com/office/powerpoint/2010/main" val="1739433681"/>
+      </p:ext>
+    </p:extLst>
+  </p:cSld>
+  <p:clrMapOvr>
+    <a:masterClrMapping/>
+  </p:clrMapOvr>
+</p:sld>
+</file>
+
+<file path=ppt/slides/slide5.xml><?xml version="1.0" encoding="utf-8"?>
 <p:sld xmlns:a="http://schemas.openxmlformats.org/drawingml/2006/main" xmlns:r="http://schemas.openxmlformats.org/officeDocument/2006/relationships" xmlns:p="http://schemas.openxmlformats.org/presentationml/2006/main">
   <p:cSld>
     <p:spTree>
@@ -14964,7 +15929,7 @@
 </p:sld>
 </file>
 
-<file path=ppt/slides/slide4.xml><?xml version="1.0" encoding="utf-8"?>
+<file path=ppt/slides/slide6.xml><?xml version="1.0" encoding="utf-8"?>
 <p:sld xmlns:a="http://schemas.openxmlformats.org/drawingml/2006/main" xmlns:r="http://schemas.openxmlformats.org/officeDocument/2006/relationships" xmlns:p="http://schemas.openxmlformats.org/presentationml/2006/main">
   <p:cSld>
     <p:spTree>
@@ -15059,7 +16024,7 @@
 </p:sld>
 </file>
 
-<file path=ppt/slides/slide5.xml><?xml version="1.0" encoding="utf-8"?>
+<file path=ppt/slides/slide7.xml><?xml version="1.0" encoding="utf-8"?>
 <p:sld xmlns:a="http://schemas.openxmlformats.org/drawingml/2006/main" xmlns:r="http://schemas.openxmlformats.org/officeDocument/2006/relationships" xmlns:p="http://schemas.openxmlformats.org/presentationml/2006/main">
   <p:cSld>
     <p:spTree>
@@ -15187,130 +16152,10 @@
   <p:clrMapOvr>
     <a:masterClrMapping/>
   </p:clrMapOvr>
-  <p:timing>
-    <p:tnLst>
-      <p:par>
-        <p:cTn id="1" dur="indefinite" restart="never" nodeType="tmRoot">
-          <p:childTnLst>
-            <p:seq concurrent="1" nextAc="seek">
-              <p:cTn id="2" dur="indefinite" nodeType="mainSeq">
-                <p:childTnLst>
-                  <p:par>
-                    <p:cTn id="3" fill="hold">
-                      <p:stCondLst>
-                        <p:cond delay="indefinite"/>
-                      </p:stCondLst>
-                      <p:childTnLst>
-                        <p:par>
-                          <p:cTn id="4" fill="hold">
-                            <p:stCondLst>
-                              <p:cond delay="0"/>
-                            </p:stCondLst>
-                            <p:childTnLst>
-                              <p:par>
-                                <p:cTn id="5" presetID="1" presetClass="entr" presetSubtype="0" fill="hold" nodeType="clickEffect">
-                                  <p:stCondLst>
-                                    <p:cond delay="0"/>
-                                  </p:stCondLst>
-                                  <p:childTnLst>
-                                    <p:set>
-                                      <p:cBhvr>
-                                        <p:cTn id="6" dur="1" fill="hold">
-                                          <p:stCondLst>
-                                            <p:cond delay="0"/>
-                                          </p:stCondLst>
-                                        </p:cTn>
-                                        <p:tgtEl>
-                                          <p:spTgt spid="5"/>
-                                        </p:tgtEl>
-                                        <p:attrNameLst>
-                                          <p:attrName>style.visibility</p:attrName>
-                                        </p:attrNameLst>
-                                      </p:cBhvr>
-                                      <p:to>
-                                        <p:strVal val="visible"/>
-                                      </p:to>
-                                    </p:set>
-                                  </p:childTnLst>
-                                </p:cTn>
-                              </p:par>
-                            </p:childTnLst>
-                          </p:cTn>
-                        </p:par>
-                      </p:childTnLst>
-                    </p:cTn>
-                  </p:par>
-                  <p:par>
-                    <p:cTn id="7" fill="hold">
-                      <p:stCondLst>
-                        <p:cond delay="indefinite"/>
-                      </p:stCondLst>
-                      <p:childTnLst>
-                        <p:par>
-                          <p:cTn id="8" fill="hold">
-                            <p:stCondLst>
-                              <p:cond delay="0"/>
-                            </p:stCondLst>
-                            <p:childTnLst>
-                              <p:par>
-                                <p:cTn id="9" presetID="1" presetClass="entr" presetSubtype="0" fill="hold" nodeType="clickEffect">
-                                  <p:stCondLst>
-                                    <p:cond delay="0"/>
-                                  </p:stCondLst>
-                                  <p:childTnLst>
-                                    <p:set>
-                                      <p:cBhvr>
-                                        <p:cTn id="10" dur="1" fill="hold">
-                                          <p:stCondLst>
-                                            <p:cond delay="0"/>
-                                          </p:stCondLst>
-                                        </p:cTn>
-                                        <p:tgtEl>
-                                          <p:spTgt spid="7"/>
-                                        </p:tgtEl>
-                                        <p:attrNameLst>
-                                          <p:attrName>style.visibility</p:attrName>
-                                        </p:attrNameLst>
-                                      </p:cBhvr>
-                                      <p:to>
-                                        <p:strVal val="visible"/>
-                                      </p:to>
-                                    </p:set>
-                                  </p:childTnLst>
-                                </p:cTn>
-                              </p:par>
-                            </p:childTnLst>
-                          </p:cTn>
-                        </p:par>
-                      </p:childTnLst>
-                    </p:cTn>
-                  </p:par>
-                </p:childTnLst>
-              </p:cTn>
-              <p:prevCondLst>
-                <p:cond evt="onPrev" delay="0">
-                  <p:tgtEl>
-                    <p:sldTgt/>
-                  </p:tgtEl>
-                </p:cond>
-              </p:prevCondLst>
-              <p:nextCondLst>
-                <p:cond evt="onNext" delay="0">
-                  <p:tgtEl>
-                    <p:sldTgt/>
-                  </p:tgtEl>
-                </p:cond>
-              </p:nextCondLst>
-            </p:seq>
-          </p:childTnLst>
-        </p:cTn>
-      </p:par>
-    </p:tnLst>
-  </p:timing>
 </p:sld>
 </file>
 
-<file path=ppt/slides/slide6.xml><?xml version="1.0" encoding="utf-8"?>
+<file path=ppt/slides/slide8.xml><?xml version="1.0" encoding="utf-8"?>
 <p:sld xmlns:a="http://schemas.openxmlformats.org/drawingml/2006/main" xmlns:r="http://schemas.openxmlformats.org/officeDocument/2006/relationships" xmlns:p="http://schemas.openxmlformats.org/presentationml/2006/main">
   <p:cSld>
     <p:spTree>
@@ -15843,220 +16688,7 @@
 </p:sld>
 </file>
 
-<file path=ppt/slides/slide7.xml><?xml version="1.0" encoding="utf-8"?>
-<p:sld xmlns:a="http://schemas.openxmlformats.org/drawingml/2006/main" xmlns:r="http://schemas.openxmlformats.org/officeDocument/2006/relationships" xmlns:p="http://schemas.openxmlformats.org/presentationml/2006/main">
-  <p:cSld>
-    <p:spTree>
-      <p:nvGrpSpPr>
-        <p:cNvPr id="1" name=""/>
-        <p:cNvGrpSpPr/>
-        <p:nvPr/>
-      </p:nvGrpSpPr>
-      <p:grpSpPr>
-        <a:xfrm>
-          <a:off x="0" y="0"/>
-          <a:ext cx="0" cy="0"/>
-          <a:chOff x="0" y="0"/>
-          <a:chExt cx="0" cy="0"/>
-        </a:xfrm>
-      </p:grpSpPr>
-      <p:sp>
-        <p:nvSpPr>
-          <p:cNvPr id="2" name="Title 1">
-            <a:extLst>
-              <a:ext uri="{FF2B5EF4-FFF2-40B4-BE49-F238E27FC236}">
-                <a16:creationId xmlns:a16="http://schemas.microsoft.com/office/drawing/2014/main" id="{4888F7A2-6541-7804-044E-92BB697BCBF3}"/>
-              </a:ext>
-            </a:extLst>
-          </p:cNvPr>
-          <p:cNvSpPr>
-            <a:spLocks noGrp="1"/>
-          </p:cNvSpPr>
-          <p:nvPr>
-            <p:ph type="title"/>
-          </p:nvPr>
-        </p:nvSpPr>
-        <p:spPr/>
-        <p:txBody>
-          <a:bodyPr/>
-          <a:lstStyle/>
-          <a:p>
-            <a:r>
-              <a:rPr lang="en-US" dirty="0"/>
-              <a:t>Docker Swarm – More Insight</a:t>
-            </a:r>
-            <a:endParaRPr lang="en-IN" dirty="0"/>
-          </a:p>
-        </p:txBody>
-      </p:sp>
-      <p:sp>
-        <p:nvSpPr>
-          <p:cNvPr id="3" name="Content Placeholder 2">
-            <a:extLst>
-              <a:ext uri="{FF2B5EF4-FFF2-40B4-BE49-F238E27FC236}">
-                <a16:creationId xmlns:a16="http://schemas.microsoft.com/office/drawing/2014/main" id="{3DBDBB4D-9668-0EB8-5926-A1461797187C}"/>
-              </a:ext>
-            </a:extLst>
-          </p:cNvPr>
-          <p:cNvSpPr>
-            <a:spLocks noGrp="1"/>
-          </p:cNvSpPr>
-          <p:nvPr>
-            <p:ph idx="1"/>
-          </p:nvPr>
-        </p:nvSpPr>
-        <p:spPr>
-          <a:xfrm>
-            <a:off x="1154954" y="2603500"/>
-            <a:ext cx="8825659" cy="3966112"/>
-          </a:xfrm>
-        </p:spPr>
-        <p:txBody>
-          <a:bodyPr>
-            <a:normAutofit fontScale="92500" lnSpcReduction="20000"/>
-          </a:bodyPr>
-          <a:lstStyle/>
-          <a:p>
-            <a:r>
-              <a:rPr lang="en-US" dirty="0"/>
-              <a:t>Key Concepts – Services &amp; task: </a:t>
-            </a:r>
-            <a:r>
-              <a:rPr lang="en-US" dirty="0">
-                <a:hlinkClick r:id="rId2"/>
-              </a:rPr>
-              <a:t>https://docs.docker.com/engine/swarm/key-concepts/</a:t>
-            </a:r>
-            <a:endParaRPr lang="en-US" dirty="0"/>
-          </a:p>
-          <a:p>
-            <a:r>
-              <a:rPr lang="en-US" dirty="0"/>
-              <a:t>Deploy to Swarm - </a:t>
-            </a:r>
-            <a:r>
-              <a:rPr lang="en-US" dirty="0">
-                <a:hlinkClick r:id="rId3"/>
-              </a:rPr>
-              <a:t>https://docs.docker.com/get-started/swarm-deploy/</a:t>
-            </a:r>
-            <a:endParaRPr lang="en-US" dirty="0"/>
-          </a:p>
-          <a:p>
-            <a:r>
-              <a:rPr lang="en-US" dirty="0"/>
-              <a:t>Swarm Mode - </a:t>
-            </a:r>
-            <a:r>
-              <a:rPr lang="en-US" dirty="0">
-                <a:hlinkClick r:id="rId4"/>
-              </a:rPr>
-              <a:t>https://docs.docker.com/engine/swarm/</a:t>
-            </a:r>
-            <a:endParaRPr lang="en-US" dirty="0"/>
-          </a:p>
-          <a:p>
-            <a:r>
-              <a:rPr lang="en-US" dirty="0"/>
-              <a:t>How Nodes work in Swarm mode - </a:t>
-            </a:r>
-            <a:r>
-              <a:rPr lang="en-US" dirty="0">
-                <a:hlinkClick r:id="rId5"/>
-              </a:rPr>
-              <a:t>https://docs.docker.com/engine/swarm/how-swarm-mode-works/nodes/</a:t>
-            </a:r>
-            <a:endParaRPr lang="en-US" dirty="0"/>
-          </a:p>
-          <a:p>
-            <a:r>
-              <a:rPr lang="en-US" dirty="0"/>
-              <a:t>How Service work - </a:t>
-            </a:r>
-            <a:r>
-              <a:rPr lang="en-US" dirty="0">
-                <a:hlinkClick r:id="rId6"/>
-              </a:rPr>
-              <a:t>https://docs.docker.com/engine/swarm/how-swarm-mode-works/services/</a:t>
-            </a:r>
-            <a:endParaRPr lang="en-US" dirty="0"/>
-          </a:p>
-          <a:p>
-            <a:r>
-              <a:rPr lang="en-US" dirty="0"/>
-              <a:t>Security with Docker Swarm - </a:t>
-            </a:r>
-            <a:r>
-              <a:rPr lang="en-US" dirty="0">
-                <a:hlinkClick r:id="rId7"/>
-              </a:rPr>
-              <a:t>https://docs.docker.com/engine/swarm/how-swarm-mode-works/pki/</a:t>
-            </a:r>
-            <a:endParaRPr lang="en-US" dirty="0"/>
-          </a:p>
-          <a:p>
-            <a:r>
-              <a:rPr lang="en-US" dirty="0"/>
-              <a:t>Swarm Task State - </a:t>
-            </a:r>
-            <a:r>
-              <a:rPr lang="en-US" dirty="0">
-                <a:hlinkClick r:id="rId8"/>
-              </a:rPr>
-              <a:t>https://docs.docker.com/engine/swarm/how-swarm-mode-works/swarm-task-states/</a:t>
-            </a:r>
-            <a:endParaRPr lang="en-US" dirty="0"/>
-          </a:p>
-          <a:p>
-            <a:r>
-              <a:rPr lang="en-US" dirty="0"/>
-              <a:t>Docker Swarm Networking concept: </a:t>
-            </a:r>
-            <a:r>
-              <a:rPr lang="en-US" dirty="0">
-                <a:hlinkClick r:id="rId9"/>
-              </a:rPr>
-              <a:t>https://docs.docker.com/engine/swarm/networking/</a:t>
-            </a:r>
-            <a:endParaRPr lang="en-US" dirty="0"/>
-          </a:p>
-          <a:p>
-            <a:pPr marL="0" indent="0">
-              <a:buNone/>
-            </a:pPr>
-            <a:endParaRPr lang="en-US" dirty="0"/>
-          </a:p>
-          <a:p>
-            <a:endParaRPr lang="en-US" dirty="0"/>
-          </a:p>
-          <a:p>
-            <a:endParaRPr lang="en-US" dirty="0"/>
-          </a:p>
-          <a:p>
-            <a:endParaRPr lang="en-US" dirty="0"/>
-          </a:p>
-          <a:p>
-            <a:endParaRPr lang="en-US" dirty="0"/>
-          </a:p>
-          <a:p>
-            <a:endParaRPr lang="en-IN" dirty="0"/>
-          </a:p>
-        </p:txBody>
-      </p:sp>
-    </p:spTree>
-    <p:extLst>
-      <p:ext uri="{BB962C8B-B14F-4D97-AF65-F5344CB8AC3E}">
-        <p14:creationId xmlns:p14="http://schemas.microsoft.com/office/powerpoint/2010/main" val="2131128461"/>
-      </p:ext>
-    </p:extLst>
-  </p:cSld>
-  <p:clrMapOvr>
-    <a:masterClrMapping/>
-  </p:clrMapOvr>
-</p:sld>
-</file>
-
-<file path=ppt/slides/slide8.xml><?xml version="1.0" encoding="utf-8"?>
+<file path=ppt/slides/slide9.xml><?xml version="1.0" encoding="utf-8"?>
 <p:sld xmlns:a="http://schemas.openxmlformats.org/drawingml/2006/main" xmlns:r="http://schemas.openxmlformats.org/officeDocument/2006/relationships" xmlns:p="http://schemas.openxmlformats.org/presentationml/2006/main">
   <p:cSld>
     <p:spTree>

</xml_diff>